<commit_message>
going into He/S min ratio
</commit_message>
<xml_diff>
--- a/Lectures/Other and previous/Jets_&_Plumes.pptx
+++ b/Lectures/Other and previous/Jets_&_Plumes.pptx
@@ -53,26 +53,26 @@
   <p:notesSz cx="6858000" cy="9190038"/>
   <p:embeddedFontLst>
     <p:embeddedFont>
-      <p:font typeface="Cambria Math" pitchFamily="18" charset="0"/>
+      <p:font typeface="Trebuchet MS" panose="020B0603020202020204" pitchFamily="34" charset="0"/>
       <p:regular r:id="rId41"/>
+      <p:bold r:id="rId42"/>
+      <p:italic r:id="rId43"/>
+      <p:boldItalic r:id="rId44"/>
     </p:embeddedFont>
     <p:embeddedFont>
-      <p:font typeface="Book Antiqua" pitchFamily="18" charset="0"/>
-      <p:regular r:id="rId42"/>
-      <p:bold r:id="rId43"/>
-      <p:italic r:id="rId44"/>
-      <p:boldItalic r:id="rId45"/>
+      <p:font typeface="Book Antiqua" panose="02040602050305030304" pitchFamily="18" charset="0"/>
+      <p:regular r:id="rId45"/>
+      <p:bold r:id="rId46"/>
+      <p:italic r:id="rId47"/>
+      <p:boldItalic r:id="rId48"/>
     </p:embeddedFont>
     <p:embeddedFont>
-      <p:font typeface="MT Extra" pitchFamily="18" charset="2"/>
-      <p:regular r:id="rId46"/>
+      <p:font typeface="Cambria Math" panose="02040503050406030204" pitchFamily="18" charset="0"/>
+      <p:regular r:id="rId49"/>
     </p:embeddedFont>
     <p:embeddedFont>
-      <p:font typeface="Trebuchet MS" pitchFamily="34" charset="0"/>
-      <p:regular r:id="rId47"/>
-      <p:bold r:id="rId48"/>
-      <p:italic r:id="rId49"/>
-      <p:boldItalic r:id="rId50"/>
+      <p:font typeface="MT Extra" panose="05050102010205020202" pitchFamily="18" charset="2"/>
+      <p:regular r:id="rId50"/>
     </p:embeddedFont>
   </p:embeddedFontLst>
   <p:kinsoku lang="ja-JP" invalStChars="、。，．・：；？！゛゜ヽヾゝゞ々ー’”）〕］｝〉》」』】°‰′″℃￠％ぁぃぅぇぉっゃゅょゎァィゥェォッャュョヮヵヶ!%),.:;?]}｡｣､･ｧｨｩｪｫｬｭｮｯｰﾞﾟ" invalEndChars="‘“（〔［｛〈《「『【￥＄$([\{｢￡"/>
@@ -201,6 +201,36 @@
       </a:defRPr>
     </a:lvl9pPr>
   </p:defaultTextStyle>
+  <p:extLst>
+    <p:ext uri="{EFAFB233-063F-42B5-8137-9DF3F51BA10A}">
+      <p15:sldGuideLst xmlns:p15="http://schemas.microsoft.com/office/powerpoint/2012/main">
+        <p15:guide id="1" orient="horz" pos="2160">
+          <p15:clr>
+            <a:srgbClr val="A4A3A4"/>
+          </p15:clr>
+        </p15:guide>
+        <p15:guide id="2" pos="2880">
+          <p15:clr>
+            <a:srgbClr val="A4A3A4"/>
+          </p15:clr>
+        </p15:guide>
+      </p15:sldGuideLst>
+    </p:ext>
+    <p:ext uri="{2D200454-40CA-4A62-9FC3-DE9A4176ACB9}">
+      <p15:notesGuideLst xmlns:p15="http://schemas.microsoft.com/office/powerpoint/2012/main">
+        <p15:guide id="1" orient="horz" pos="2894">
+          <p15:clr>
+            <a:srgbClr val="A4A3A4"/>
+          </p15:clr>
+        </p15:guide>
+        <p15:guide id="2" pos="2160">
+          <p15:clr>
+            <a:srgbClr val="A4A3A4"/>
+          </p15:clr>
+        </p15:guide>
+      </p15:notesGuideLst>
+    </p:ext>
+  </p:extLst>
 </p:presentation>
 </file>
 
@@ -324,7 +354,7 @@
                 <a:latin typeface="Book Antiqua" pitchFamily="18" charset="0"/>
               </a:rPr>
               <a:pPr/>
-              <a:t>July 8, 2015</a:t>
+              <a:t>May 29, 2018</a:t>
             </a:fld>
             <a:endParaRPr lang="en-US" sz="1000">
               <a:latin typeface="Book Antiqua" pitchFamily="18" charset="0"/>
@@ -528,35 +558,35 @@
           <a:p>
             <a:pPr lvl="0"/>
             <a:r>
-              <a:rPr lang="en-US" smtClean="0"/>
+              <a:rPr lang="en-US"/>
               <a:t>Click to edit Master text styles</a:t>
             </a:r>
           </a:p>
           <a:p>
             <a:pPr lvl="1"/>
             <a:r>
-              <a:rPr lang="en-US" smtClean="0"/>
+              <a:rPr lang="en-US"/>
               <a:t>Second level</a:t>
             </a:r>
           </a:p>
           <a:p>
             <a:pPr lvl="2"/>
             <a:r>
-              <a:rPr lang="en-US" smtClean="0"/>
+              <a:rPr lang="en-US"/>
               <a:t>Third level</a:t>
             </a:r>
           </a:p>
           <a:p>
             <a:pPr lvl="3"/>
             <a:r>
-              <a:rPr lang="en-US" smtClean="0"/>
+              <a:rPr lang="en-US"/>
               <a:t>Fourth level</a:t>
             </a:r>
           </a:p>
           <a:p>
             <a:pPr lvl="4"/>
             <a:r>
-              <a:rPr lang="en-US" smtClean="0"/>
+              <a:rPr lang="en-US"/>
               <a:t>Fifth level</a:t>
             </a:r>
           </a:p>
@@ -1530,7 +1560,7 @@
           <a:lstStyle/>
           <a:p>
             <a:r>
-              <a:rPr lang="en-US" smtClean="0"/>
+              <a:rPr lang="en-US"/>
               <a:t>Click to edit Master title style</a:t>
             </a:r>
             <a:endParaRPr lang="es-CO"/>
@@ -1554,35 +1584,35 @@
           <a:p>
             <a:pPr lvl="0"/>
             <a:r>
-              <a:rPr lang="en-US" smtClean="0"/>
+              <a:rPr lang="en-US"/>
               <a:t>Click to edit Master text styles</a:t>
             </a:r>
           </a:p>
           <a:p>
             <a:pPr lvl="1"/>
             <a:r>
-              <a:rPr lang="en-US" smtClean="0"/>
+              <a:rPr lang="en-US"/>
               <a:t>Second level</a:t>
             </a:r>
           </a:p>
           <a:p>
             <a:pPr lvl="2"/>
             <a:r>
-              <a:rPr lang="en-US" smtClean="0"/>
+              <a:rPr lang="en-US"/>
               <a:t>Third level</a:t>
             </a:r>
           </a:p>
           <a:p>
             <a:pPr lvl="3"/>
             <a:r>
-              <a:rPr lang="en-US" smtClean="0"/>
+              <a:rPr lang="en-US"/>
               <a:t>Fourth level</a:t>
             </a:r>
           </a:p>
           <a:p>
             <a:pPr lvl="4"/>
             <a:r>
-              <a:rPr lang="en-US" smtClean="0"/>
+              <a:rPr lang="en-US"/>
               <a:t>Fifth level</a:t>
             </a:r>
             <a:endParaRPr lang="es-CO"/>
@@ -1709,7 +1739,7 @@
           <a:lstStyle/>
           <a:p>
             <a:r>
-              <a:rPr lang="en-US" smtClean="0"/>
+              <a:rPr lang="en-US"/>
               <a:t>Click to edit Master title style</a:t>
             </a:r>
             <a:endParaRPr lang="es-CO"/>
@@ -1738,35 +1768,35 @@
           <a:p>
             <a:pPr lvl="0"/>
             <a:r>
-              <a:rPr lang="en-US" smtClean="0"/>
+              <a:rPr lang="en-US"/>
               <a:t>Click to edit Master text styles</a:t>
             </a:r>
           </a:p>
           <a:p>
             <a:pPr lvl="1"/>
             <a:r>
-              <a:rPr lang="en-US" smtClean="0"/>
+              <a:rPr lang="en-US"/>
               <a:t>Second level</a:t>
             </a:r>
           </a:p>
           <a:p>
             <a:pPr lvl="2"/>
             <a:r>
-              <a:rPr lang="en-US" smtClean="0"/>
+              <a:rPr lang="en-US"/>
               <a:t>Third level</a:t>
             </a:r>
           </a:p>
           <a:p>
             <a:pPr lvl="3"/>
             <a:r>
-              <a:rPr lang="en-US" smtClean="0"/>
+              <a:rPr lang="en-US"/>
               <a:t>Fourth level</a:t>
             </a:r>
           </a:p>
           <a:p>
             <a:pPr lvl="4"/>
             <a:r>
-              <a:rPr lang="en-US" smtClean="0"/>
+              <a:rPr lang="en-US"/>
               <a:t>Fifth level</a:t>
             </a:r>
             <a:endParaRPr lang="es-CO"/>
@@ -1888,7 +1918,7 @@
           <a:lstStyle/>
           <a:p>
             <a:r>
-              <a:rPr lang="en-US" smtClean="0"/>
+              <a:rPr lang="en-US"/>
               <a:t>Click to edit Master title style</a:t>
             </a:r>
             <a:endParaRPr lang="es-CO"/>
@@ -1912,35 +1942,35 @@
           <a:p>
             <a:pPr lvl="0"/>
             <a:r>
-              <a:rPr lang="en-US" smtClean="0"/>
+              <a:rPr lang="en-US"/>
               <a:t>Click to edit Master text styles</a:t>
             </a:r>
           </a:p>
           <a:p>
             <a:pPr lvl="1"/>
             <a:r>
-              <a:rPr lang="en-US" smtClean="0"/>
+              <a:rPr lang="en-US"/>
               <a:t>Second level</a:t>
             </a:r>
           </a:p>
           <a:p>
             <a:pPr lvl="2"/>
             <a:r>
-              <a:rPr lang="en-US" smtClean="0"/>
+              <a:rPr lang="en-US"/>
               <a:t>Third level</a:t>
             </a:r>
           </a:p>
           <a:p>
             <a:pPr lvl="3"/>
             <a:r>
-              <a:rPr lang="en-US" smtClean="0"/>
+              <a:rPr lang="en-US"/>
               <a:t>Fourth level</a:t>
             </a:r>
           </a:p>
           <a:p>
             <a:pPr lvl="4"/>
             <a:r>
-              <a:rPr lang="en-US" smtClean="0"/>
+              <a:rPr lang="en-US"/>
               <a:t>Fifth level</a:t>
             </a:r>
             <a:endParaRPr lang="es-CO"/>
@@ -2071,7 +2101,7 @@
           </a:lstStyle>
           <a:p>
             <a:r>
-              <a:rPr lang="en-US" smtClean="0"/>
+              <a:rPr lang="en-US"/>
               <a:t>Click to edit Master title style</a:t>
             </a:r>
             <a:endParaRPr lang="es-CO"/>
@@ -2137,7 +2167,7 @@
           <a:p>
             <a:pPr lvl="0"/>
             <a:r>
-              <a:rPr lang="en-US" smtClean="0"/>
+              <a:rPr lang="en-US"/>
               <a:t>Click to edit Master text styles</a:t>
             </a:r>
           </a:p>
@@ -2258,7 +2288,7 @@
           <a:lstStyle/>
           <a:p>
             <a:r>
-              <a:rPr lang="en-US" smtClean="0"/>
+              <a:rPr lang="en-US"/>
               <a:t>Click to edit Master title style</a:t>
             </a:r>
             <a:endParaRPr lang="es-CO"/>
@@ -2315,35 +2345,35 @@
           <a:p>
             <a:pPr lvl="0"/>
             <a:r>
-              <a:rPr lang="en-US" smtClean="0"/>
+              <a:rPr lang="en-US"/>
               <a:t>Click to edit Master text styles</a:t>
             </a:r>
           </a:p>
           <a:p>
             <a:pPr lvl="1"/>
             <a:r>
-              <a:rPr lang="en-US" smtClean="0"/>
+              <a:rPr lang="en-US"/>
               <a:t>Second level</a:t>
             </a:r>
           </a:p>
           <a:p>
             <a:pPr lvl="2"/>
             <a:r>
-              <a:rPr lang="en-US" smtClean="0"/>
+              <a:rPr lang="en-US"/>
               <a:t>Third level</a:t>
             </a:r>
           </a:p>
           <a:p>
             <a:pPr lvl="3"/>
             <a:r>
-              <a:rPr lang="en-US" smtClean="0"/>
+              <a:rPr lang="en-US"/>
               <a:t>Fourth level</a:t>
             </a:r>
           </a:p>
           <a:p>
             <a:pPr lvl="4"/>
             <a:r>
-              <a:rPr lang="en-US" smtClean="0"/>
+              <a:rPr lang="en-US"/>
               <a:t>Fifth level</a:t>
             </a:r>
             <a:endParaRPr lang="es-CO"/>
@@ -2400,35 +2430,35 @@
           <a:p>
             <a:pPr lvl="0"/>
             <a:r>
-              <a:rPr lang="en-US" smtClean="0"/>
+              <a:rPr lang="en-US"/>
               <a:t>Click to edit Master text styles</a:t>
             </a:r>
           </a:p>
           <a:p>
             <a:pPr lvl="1"/>
             <a:r>
-              <a:rPr lang="en-US" smtClean="0"/>
+              <a:rPr lang="en-US"/>
               <a:t>Second level</a:t>
             </a:r>
           </a:p>
           <a:p>
             <a:pPr lvl="2"/>
             <a:r>
-              <a:rPr lang="en-US" smtClean="0"/>
+              <a:rPr lang="en-US"/>
               <a:t>Third level</a:t>
             </a:r>
           </a:p>
           <a:p>
             <a:pPr lvl="3"/>
             <a:r>
-              <a:rPr lang="en-US" smtClean="0"/>
+              <a:rPr lang="en-US"/>
               <a:t>Fourth level</a:t>
             </a:r>
           </a:p>
           <a:p>
             <a:pPr lvl="4"/>
             <a:r>
-              <a:rPr lang="en-US" smtClean="0"/>
+              <a:rPr lang="en-US"/>
               <a:t>Fifth level</a:t>
             </a:r>
             <a:endParaRPr lang="es-CO"/>
@@ -2559,7 +2589,7 @@
           </a:lstStyle>
           <a:p>
             <a:r>
-              <a:rPr lang="en-US" smtClean="0"/>
+              <a:rPr lang="en-US"/>
               <a:t>Click to edit Master title style</a:t>
             </a:r>
             <a:endParaRPr lang="es-CO"/>
@@ -2625,7 +2655,7 @@
           <a:p>
             <a:pPr lvl="0"/>
             <a:r>
-              <a:rPr lang="en-US" smtClean="0"/>
+              <a:rPr lang="en-US"/>
               <a:t>Click to edit Master text styles</a:t>
             </a:r>
           </a:p>
@@ -2681,35 +2711,35 @@
           <a:p>
             <a:pPr lvl="0"/>
             <a:r>
-              <a:rPr lang="en-US" smtClean="0"/>
+              <a:rPr lang="en-US"/>
               <a:t>Click to edit Master text styles</a:t>
             </a:r>
           </a:p>
           <a:p>
             <a:pPr lvl="1"/>
             <a:r>
-              <a:rPr lang="en-US" smtClean="0"/>
+              <a:rPr lang="en-US"/>
               <a:t>Second level</a:t>
             </a:r>
           </a:p>
           <a:p>
             <a:pPr lvl="2"/>
             <a:r>
-              <a:rPr lang="en-US" smtClean="0"/>
+              <a:rPr lang="en-US"/>
               <a:t>Third level</a:t>
             </a:r>
           </a:p>
           <a:p>
             <a:pPr lvl="3"/>
             <a:r>
-              <a:rPr lang="en-US" smtClean="0"/>
+              <a:rPr lang="en-US"/>
               <a:t>Fourth level</a:t>
             </a:r>
           </a:p>
           <a:p>
             <a:pPr lvl="4"/>
             <a:r>
-              <a:rPr lang="en-US" smtClean="0"/>
+              <a:rPr lang="en-US"/>
               <a:t>Fifth level</a:t>
             </a:r>
             <a:endParaRPr lang="es-CO"/>
@@ -2775,7 +2805,7 @@
           <a:p>
             <a:pPr lvl="0"/>
             <a:r>
-              <a:rPr lang="en-US" smtClean="0"/>
+              <a:rPr lang="en-US"/>
               <a:t>Click to edit Master text styles</a:t>
             </a:r>
           </a:p>
@@ -2831,35 +2861,35 @@
           <a:p>
             <a:pPr lvl="0"/>
             <a:r>
-              <a:rPr lang="en-US" smtClean="0"/>
+              <a:rPr lang="en-US"/>
               <a:t>Click to edit Master text styles</a:t>
             </a:r>
           </a:p>
           <a:p>
             <a:pPr lvl="1"/>
             <a:r>
-              <a:rPr lang="en-US" smtClean="0"/>
+              <a:rPr lang="en-US"/>
               <a:t>Second level</a:t>
             </a:r>
           </a:p>
           <a:p>
             <a:pPr lvl="2"/>
             <a:r>
-              <a:rPr lang="en-US" smtClean="0"/>
+              <a:rPr lang="en-US"/>
               <a:t>Third level</a:t>
             </a:r>
           </a:p>
           <a:p>
             <a:pPr lvl="3"/>
             <a:r>
-              <a:rPr lang="en-US" smtClean="0"/>
+              <a:rPr lang="en-US"/>
               <a:t>Fourth level</a:t>
             </a:r>
           </a:p>
           <a:p>
             <a:pPr lvl="4"/>
             <a:r>
-              <a:rPr lang="en-US" smtClean="0"/>
+              <a:rPr lang="en-US"/>
               <a:t>Fifth level</a:t>
             </a:r>
             <a:endParaRPr lang="es-CO"/>
@@ -2981,7 +3011,7 @@
           <a:lstStyle/>
           <a:p>
             <a:r>
-              <a:rPr lang="en-US" smtClean="0"/>
+              <a:rPr lang="en-US"/>
               <a:t>Click to edit Master title style</a:t>
             </a:r>
             <a:endParaRPr lang="es-CO"/>
@@ -3211,7 +3241,7 @@
           </a:lstStyle>
           <a:p>
             <a:r>
-              <a:rPr lang="en-US" smtClean="0"/>
+              <a:rPr lang="en-US"/>
               <a:t>Click to edit Master title style</a:t>
             </a:r>
             <a:endParaRPr lang="es-CO"/>
@@ -3268,35 +3298,35 @@
           <a:p>
             <a:pPr lvl="0"/>
             <a:r>
-              <a:rPr lang="en-US" smtClean="0"/>
+              <a:rPr lang="en-US"/>
               <a:t>Click to edit Master text styles</a:t>
             </a:r>
           </a:p>
           <a:p>
             <a:pPr lvl="1"/>
             <a:r>
-              <a:rPr lang="en-US" smtClean="0"/>
+              <a:rPr lang="en-US"/>
               <a:t>Second level</a:t>
             </a:r>
           </a:p>
           <a:p>
             <a:pPr lvl="2"/>
             <a:r>
-              <a:rPr lang="en-US" smtClean="0"/>
+              <a:rPr lang="en-US"/>
               <a:t>Third level</a:t>
             </a:r>
           </a:p>
           <a:p>
             <a:pPr lvl="3"/>
             <a:r>
-              <a:rPr lang="en-US" smtClean="0"/>
+              <a:rPr lang="en-US"/>
               <a:t>Fourth level</a:t>
             </a:r>
           </a:p>
           <a:p>
             <a:pPr lvl="4"/>
             <a:r>
-              <a:rPr lang="en-US" smtClean="0"/>
+              <a:rPr lang="en-US"/>
               <a:t>Fifth level</a:t>
             </a:r>
             <a:endParaRPr lang="es-CO"/>
@@ -3362,7 +3392,7 @@
           <a:p>
             <a:pPr lvl="0"/>
             <a:r>
-              <a:rPr lang="en-US" smtClean="0"/>
+              <a:rPr lang="en-US"/>
               <a:t>Click to edit Master text styles</a:t>
             </a:r>
           </a:p>
@@ -3492,7 +3522,7 @@
           </a:lstStyle>
           <a:p>
             <a:r>
-              <a:rPr lang="en-US" smtClean="0"/>
+              <a:rPr lang="en-US"/>
               <a:t>Click to edit Master title style</a:t>
             </a:r>
             <a:endParaRPr lang="es-CO"/>
@@ -3619,7 +3649,7 @@
           <a:p>
             <a:pPr lvl="0"/>
             <a:r>
-              <a:rPr lang="en-US" smtClean="0"/>
+              <a:rPr lang="en-US"/>
               <a:t>Click to edit Master text styles</a:t>
             </a:r>
           </a:p>
@@ -3865,7 +3895,7 @@
           <a:p>
             <a:pPr lvl="0"/>
             <a:r>
-              <a:rPr lang="en-US" smtClean="0"/>
+              <a:rPr lang="en-US"/>
               <a:t>Click to edit Master title style</a:t>
             </a:r>
           </a:p>
@@ -3908,35 +3938,35 @@
           <a:p>
             <a:pPr lvl="0"/>
             <a:r>
-              <a:rPr lang="en-US" smtClean="0"/>
+              <a:rPr lang="en-US"/>
               <a:t>Click to edit Master text styles</a:t>
             </a:r>
           </a:p>
           <a:p>
             <a:pPr lvl="1"/>
             <a:r>
-              <a:rPr lang="en-US" smtClean="0"/>
+              <a:rPr lang="en-US"/>
               <a:t>Second Level</a:t>
             </a:r>
           </a:p>
           <a:p>
             <a:pPr lvl="2"/>
             <a:r>
-              <a:rPr lang="en-US" smtClean="0"/>
+              <a:rPr lang="en-US"/>
               <a:t>Third Level</a:t>
             </a:r>
           </a:p>
           <a:p>
             <a:pPr lvl="3"/>
             <a:r>
-              <a:rPr lang="en-US" smtClean="0"/>
+              <a:rPr lang="en-US"/>
               <a:t>Fourth Level</a:t>
             </a:r>
           </a:p>
           <a:p>
             <a:pPr lvl="4"/>
             <a:r>
-              <a:rPr lang="en-US" smtClean="0"/>
+              <a:rPr lang="en-US"/>
               <a:t>Fifth Level</a:t>
             </a:r>
           </a:p>
@@ -13349,7 +13379,7 @@
           <a:graphicData uri="http://schemas.openxmlformats.org/presentationml/2006/ole">
             <mc:AlternateContent xmlns:mc="http://schemas.openxmlformats.org/markup-compatibility/2006">
               <mc:Choice xmlns:v="urn:schemas-microsoft-com:vml" Requires="v">
-                <p:oleObj spid="_x0000_s17491" name="Equation" r:id="rId3" imgW="901440" imgH="279360" progId="Equation.3">
+                <p:oleObj spid="_x0000_s17495" name="Equation" r:id="rId3" imgW="901440" imgH="279360" progId="Equation.3">
                   <p:embed/>
                 </p:oleObj>
               </mc:Choice>
@@ -13444,7 +13474,7 @@
           <a:graphicData uri="http://schemas.openxmlformats.org/presentationml/2006/ole">
             <mc:AlternateContent xmlns:mc="http://schemas.openxmlformats.org/markup-compatibility/2006">
               <mc:Choice xmlns:v="urn:schemas-microsoft-com:vml" Requires="v">
-                <p:oleObj spid="_x0000_s17492" name="Equation" r:id="rId5" imgW="1117440" imgH="876240" progId="Equation.3">
+                <p:oleObj spid="_x0000_s17496" name="Equation" r:id="rId5" imgW="1117440" imgH="876240" progId="Equation.3">
                   <p:embed/>
                 </p:oleObj>
               </mc:Choice>
@@ -13539,7 +13569,7 @@
           <a:graphicData uri="http://schemas.openxmlformats.org/presentationml/2006/ole">
             <mc:AlternateContent xmlns:mc="http://schemas.openxmlformats.org/markup-compatibility/2006">
               <mc:Choice xmlns:v="urn:schemas-microsoft-com:vml" Requires="v">
-                <p:oleObj spid="_x0000_s17493" name="Equation" r:id="rId7" imgW="660240" imgH="279360" progId="Equation.3">
+                <p:oleObj spid="_x0000_s17497" name="Equation" r:id="rId7" imgW="660240" imgH="279360" progId="Equation.3">
                   <p:embed/>
                 </p:oleObj>
               </mc:Choice>
@@ -13708,7 +13738,7 @@
           <a:graphicData uri="http://schemas.openxmlformats.org/presentationml/2006/ole">
             <mc:AlternateContent xmlns:mc="http://schemas.openxmlformats.org/markup-compatibility/2006">
               <mc:Choice xmlns:v="urn:schemas-microsoft-com:vml" Requires="v">
-                <p:oleObj spid="_x0000_s17494" name="Equation" r:id="rId9" imgW="1371600" imgH="279360" progId="Equation.3">
+                <p:oleObj spid="_x0000_s17498" name="Equation" r:id="rId9" imgW="1371600" imgH="279360" progId="Equation.3">
                   <p:embed/>
                 </p:oleObj>
               </mc:Choice>
@@ -14047,7 +14077,7 @@
           <a:graphicData uri="http://schemas.openxmlformats.org/presentationml/2006/ole">
             <mc:AlternateContent xmlns:mc="http://schemas.openxmlformats.org/markup-compatibility/2006">
               <mc:Choice xmlns:v="urn:schemas-microsoft-com:vml" Requires="v">
-                <p:oleObj spid="_x0000_s18494" name="Equation" r:id="rId4" imgW="1282680" imgH="863280" progId="Equation.3">
+                <p:oleObj spid="_x0000_s18503" name="Equation" r:id="rId4" imgW="1282680" imgH="863280" progId="Equation.3">
                   <p:embed/>
                 </p:oleObj>
               </mc:Choice>
@@ -14185,7 +14215,7 @@
           <a:graphicData uri="http://schemas.openxmlformats.org/presentationml/2006/ole">
             <mc:AlternateContent xmlns:mc="http://schemas.openxmlformats.org/markup-compatibility/2006">
               <mc:Choice xmlns:v="urn:schemas-microsoft-com:vml" Requires="v">
-                <p:oleObj spid="_x0000_s18495" name="Equation" r:id="rId6" imgW="1726920" imgH="419040" progId="Equation.3">
+                <p:oleObj spid="_x0000_s18504" name="Equation" r:id="rId6" imgW="1726920" imgH="419040" progId="Equation.3">
                   <p:embed/>
                 </p:oleObj>
               </mc:Choice>
@@ -14280,7 +14310,7 @@
           <a:graphicData uri="http://schemas.openxmlformats.org/presentationml/2006/ole">
             <mc:AlternateContent xmlns:mc="http://schemas.openxmlformats.org/markup-compatibility/2006">
               <mc:Choice xmlns:v="urn:schemas-microsoft-com:vml" Requires="v">
-                <p:oleObj spid="_x0000_s18496" name="Equation" r:id="rId8" imgW="2565360" imgH="863280" progId="Equation.3">
+                <p:oleObj spid="_x0000_s18505" name="Equation" r:id="rId8" imgW="2565360" imgH="863280" progId="Equation.3">
                   <p:embed/>
                 </p:oleObj>
               </mc:Choice>
@@ -14375,7 +14405,7 @@
           <a:graphicData uri="http://schemas.openxmlformats.org/presentationml/2006/ole">
             <mc:AlternateContent xmlns:mc="http://schemas.openxmlformats.org/markup-compatibility/2006">
               <mc:Choice xmlns:v="urn:schemas-microsoft-com:vml" Requires="v">
-                <p:oleObj spid="_x0000_s18497" name="Equation" r:id="rId10" imgW="1676160" imgH="380880" progId="Equation.3">
+                <p:oleObj spid="_x0000_s18506" name="Equation" r:id="rId10" imgW="1676160" imgH="380880" progId="Equation.3">
                   <p:embed/>
                 </p:oleObj>
               </mc:Choice>
@@ -14470,7 +14500,7 @@
           <a:graphicData uri="http://schemas.openxmlformats.org/presentationml/2006/ole">
             <mc:AlternateContent xmlns:mc="http://schemas.openxmlformats.org/markup-compatibility/2006">
               <mc:Choice xmlns:v="urn:schemas-microsoft-com:vml" Requires="v">
-                <p:oleObj spid="_x0000_s18498" name="Equation" r:id="rId12" imgW="1269720" imgH="876240" progId="Equation.3">
+                <p:oleObj spid="_x0000_s18507" name="Equation" r:id="rId12" imgW="1269720" imgH="876240" progId="Equation.3">
                   <p:embed/>
                 </p:oleObj>
               </mc:Choice>
@@ -14565,7 +14595,7 @@
           <a:graphicData uri="http://schemas.openxmlformats.org/presentationml/2006/ole">
             <mc:AlternateContent xmlns:mc="http://schemas.openxmlformats.org/markup-compatibility/2006">
               <mc:Choice xmlns:v="urn:schemas-microsoft-com:vml" Requires="v">
-                <p:oleObj spid="_x0000_s18499" name="Equation" r:id="rId14" imgW="1193760" imgH="787320" progId="Equation.3">
+                <p:oleObj spid="_x0000_s18508" name="Equation" r:id="rId14" imgW="1193760" imgH="787320" progId="Equation.3">
                   <p:embed/>
                 </p:oleObj>
               </mc:Choice>
@@ -15377,7 +15407,7 @@
           <a:graphicData uri="http://schemas.openxmlformats.org/presentationml/2006/ole">
             <mc:AlternateContent xmlns:mc="http://schemas.openxmlformats.org/markup-compatibility/2006">
               <mc:Choice xmlns:v="urn:schemas-microsoft-com:vml" Requires="v">
-                <p:oleObj spid="_x0000_s18500" name="Equation" r:id="rId16" imgW="3504960" imgH="419040" progId="Equation.3">
+                <p:oleObj spid="_x0000_s18509" name="Equation" r:id="rId16" imgW="3504960" imgH="419040" progId="Equation.3">
                   <p:embed/>
                 </p:oleObj>
               </mc:Choice>
@@ -15473,7 +15503,7 @@
           <a:graphicData uri="http://schemas.openxmlformats.org/presentationml/2006/ole">
             <mc:AlternateContent xmlns:mc="http://schemas.openxmlformats.org/markup-compatibility/2006">
               <mc:Choice xmlns:v="urn:schemas-microsoft-com:vml" Requires="v">
-                <p:oleObj spid="_x0000_s18501" name="Equation" r:id="rId18" imgW="2565360" imgH="419040" progId="Equation.3">
+                <p:oleObj spid="_x0000_s18510" name="Equation" r:id="rId18" imgW="2565360" imgH="419040" progId="Equation.3">
                   <p:embed/>
                 </p:oleObj>
               </mc:Choice>
@@ -15682,7 +15712,7 @@
           <a:graphicData uri="http://schemas.openxmlformats.org/presentationml/2006/ole">
             <mc:AlternateContent xmlns:mc="http://schemas.openxmlformats.org/markup-compatibility/2006">
               <mc:Choice xmlns:v="urn:schemas-microsoft-com:vml" Requires="v">
-                <p:oleObj spid="_x0000_s18502" name="Equation" r:id="rId20" imgW="660240" imgH="279360" progId="Equation.3">
+                <p:oleObj spid="_x0000_s18511" name="Equation" r:id="rId20" imgW="660240" imgH="279360" progId="Equation.3">
                   <p:embed/>
                 </p:oleObj>
               </mc:Choice>
@@ -16861,7 +16891,7 @@
           <a:graphicData uri="http://schemas.openxmlformats.org/presentationml/2006/ole">
             <mc:AlternateContent xmlns:mc="http://schemas.openxmlformats.org/markup-compatibility/2006">
               <mc:Choice xmlns:v="urn:schemas-microsoft-com:vml" Requires="v">
-                <p:oleObj spid="_x0000_s19478" name="Equation" r:id="rId4" imgW="1244520" imgH="393480" progId="Equation.3">
+                <p:oleObj spid="_x0000_s19484" name="Equation" r:id="rId4" imgW="1244520" imgH="393480" progId="Equation.3">
                   <p:embed/>
                 </p:oleObj>
               </mc:Choice>
@@ -16956,7 +16986,7 @@
           <a:graphicData uri="http://schemas.openxmlformats.org/presentationml/2006/ole">
             <mc:AlternateContent xmlns:mc="http://schemas.openxmlformats.org/markup-compatibility/2006">
               <mc:Choice xmlns:v="urn:schemas-microsoft-com:vml" Requires="v">
-                <p:oleObj spid="_x0000_s19479" name="Equation" r:id="rId6" imgW="1574640" imgH="380880" progId="Equation.3">
+                <p:oleObj spid="_x0000_s19485" name="Equation" r:id="rId6" imgW="1574640" imgH="380880" progId="Equation.3">
                   <p:embed/>
                 </p:oleObj>
               </mc:Choice>
@@ -17051,7 +17081,7 @@
           <a:graphicData uri="http://schemas.openxmlformats.org/presentationml/2006/ole">
             <mc:AlternateContent xmlns:mc="http://schemas.openxmlformats.org/markup-compatibility/2006">
               <mc:Choice xmlns:v="urn:schemas-microsoft-com:vml" Requires="v">
-                <p:oleObj spid="_x0000_s19480" name="Equation" r:id="rId8" imgW="1257120" imgH="380880" progId="Equation.3">
+                <p:oleObj spid="_x0000_s19486" name="Equation" r:id="rId8" imgW="1257120" imgH="380880" progId="Equation.3">
                   <p:embed/>
                 </p:oleObj>
               </mc:Choice>
@@ -17146,7 +17176,7 @@
           <a:graphicData uri="http://schemas.openxmlformats.org/presentationml/2006/ole">
             <mc:AlternateContent xmlns:mc="http://schemas.openxmlformats.org/markup-compatibility/2006">
               <mc:Choice xmlns:v="urn:schemas-microsoft-com:vml" Requires="v">
-                <p:oleObj spid="_x0000_s19481" name="Equation" r:id="rId10" imgW="2425680" imgH="863280" progId="Equation.3">
+                <p:oleObj spid="_x0000_s19487" name="Equation" r:id="rId10" imgW="2425680" imgH="863280" progId="Equation.3">
                   <p:embed/>
                 </p:oleObj>
               </mc:Choice>
@@ -17241,7 +17271,7 @@
           <a:graphicData uri="http://schemas.openxmlformats.org/presentationml/2006/ole">
             <mc:AlternateContent xmlns:mc="http://schemas.openxmlformats.org/markup-compatibility/2006">
               <mc:Choice xmlns:v="urn:schemas-microsoft-com:vml" Requires="v">
-                <p:oleObj spid="_x0000_s19482" name="Equation" r:id="rId12" imgW="2743200" imgH="863280" progId="Equation.3">
+                <p:oleObj spid="_x0000_s19488" name="Equation" r:id="rId12" imgW="2743200" imgH="863280" progId="Equation.3">
                   <p:embed/>
                 </p:oleObj>
               </mc:Choice>
@@ -17336,7 +17366,7 @@
           <a:graphicData uri="http://schemas.openxmlformats.org/presentationml/2006/ole">
             <mc:AlternateContent xmlns:mc="http://schemas.openxmlformats.org/markup-compatibility/2006">
               <mc:Choice xmlns:v="urn:schemas-microsoft-com:vml" Requires="v">
-                <p:oleObj spid="_x0000_s19483" name="Equation" r:id="rId14" imgW="2654280" imgH="863280" progId="Equation.3">
+                <p:oleObj spid="_x0000_s19489" name="Equation" r:id="rId14" imgW="2654280" imgH="863280" progId="Equation.3">
                   <p:embed/>
                 </p:oleObj>
               </mc:Choice>
@@ -18815,7 +18845,7 @@
           <a:graphicData uri="http://schemas.openxmlformats.org/presentationml/2006/ole">
             <mc:AlternateContent xmlns:mc="http://schemas.openxmlformats.org/markup-compatibility/2006">
               <mc:Choice xmlns:v="urn:schemas-microsoft-com:vml" Requires="v">
-                <p:oleObj spid="_x0000_s50221" name="Equation" r:id="rId4" imgW="1638000" imgH="927000" progId="Equation.3">
+                <p:oleObj spid="_x0000_s50227" name="Equation" r:id="rId4" imgW="1638000" imgH="927000" progId="Equation.3">
                   <p:embed/>
                 </p:oleObj>
               </mc:Choice>
@@ -18910,7 +18940,7 @@
           <a:graphicData uri="http://schemas.openxmlformats.org/presentationml/2006/ole">
             <mc:AlternateContent xmlns:mc="http://schemas.openxmlformats.org/markup-compatibility/2006">
               <mc:Choice xmlns:v="urn:schemas-microsoft-com:vml" Requires="v">
-                <p:oleObj spid="_x0000_s50222" name="Equation" r:id="rId6" imgW="1498320" imgH="1206360" progId="Equation.3">
+                <p:oleObj spid="_x0000_s50228" name="Equation" r:id="rId6" imgW="1498320" imgH="1206360" progId="Equation.3">
                   <p:embed/>
                 </p:oleObj>
               </mc:Choice>
@@ -19005,7 +19035,7 @@
           <a:graphicData uri="http://schemas.openxmlformats.org/presentationml/2006/ole">
             <mc:AlternateContent xmlns:mc="http://schemas.openxmlformats.org/markup-compatibility/2006">
               <mc:Choice xmlns:v="urn:schemas-microsoft-com:vml" Requires="v">
-                <p:oleObj spid="_x0000_s50223" name="Equation" r:id="rId8" imgW="1193760" imgH="787320" progId="Equation.3">
+                <p:oleObj spid="_x0000_s50229" name="Equation" r:id="rId8" imgW="1193760" imgH="787320" progId="Equation.3">
                   <p:embed/>
                 </p:oleObj>
               </mc:Choice>
@@ -19100,7 +19130,7 @@
           <a:graphicData uri="http://schemas.openxmlformats.org/presentationml/2006/ole">
             <mc:AlternateContent xmlns:mc="http://schemas.openxmlformats.org/markup-compatibility/2006">
               <mc:Choice xmlns:v="urn:schemas-microsoft-com:vml" Requires="v">
-                <p:oleObj spid="_x0000_s50224" name="Equation" r:id="rId10" imgW="1168200" imgH="787320" progId="Equation.3">
+                <p:oleObj spid="_x0000_s50230" name="Equation" r:id="rId10" imgW="1168200" imgH="787320" progId="Equation.3">
                   <p:embed/>
                 </p:oleObj>
               </mc:Choice>
@@ -19275,7 +19305,7 @@
           <a:graphicData uri="http://schemas.openxmlformats.org/presentationml/2006/ole">
             <mc:AlternateContent xmlns:mc="http://schemas.openxmlformats.org/markup-compatibility/2006">
               <mc:Choice xmlns:v="urn:schemas-microsoft-com:vml" Requires="v">
-                <p:oleObj spid="_x0000_s50225" name="Equation" r:id="rId12" imgW="1866600" imgH="419040" progId="Equation.3">
+                <p:oleObj spid="_x0000_s50231" name="Equation" r:id="rId12" imgW="1866600" imgH="419040" progId="Equation.3">
                   <p:embed/>
                 </p:oleObj>
               </mc:Choice>
@@ -19370,7 +19400,7 @@
           <a:graphicData uri="http://schemas.openxmlformats.org/presentationml/2006/ole">
             <mc:AlternateContent xmlns:mc="http://schemas.openxmlformats.org/markup-compatibility/2006">
               <mc:Choice xmlns:v="urn:schemas-microsoft-com:vml" Requires="v">
-                <p:oleObj spid="_x0000_s50226" name="Equation" r:id="rId14" imgW="660240" imgH="279360" progId="Equation.3">
+                <p:oleObj spid="_x0000_s50232" name="Equation" r:id="rId14" imgW="660240" imgH="279360" progId="Equation.3">
                   <p:embed/>
                 </p:oleObj>
               </mc:Choice>
@@ -19772,7 +19802,7 @@
           <a:graphicData uri="http://schemas.openxmlformats.org/presentationml/2006/ole">
             <mc:AlternateContent xmlns:mc="http://schemas.openxmlformats.org/markup-compatibility/2006">
               <mc:Choice xmlns:v="urn:schemas-microsoft-com:vml" Requires="v">
-                <p:oleObj spid="_x0000_s20506" name="Equation" r:id="rId3" imgW="1193760" imgH="787320" progId="Equation.3">
+                <p:oleObj spid="_x0000_s20513" name="Equation" r:id="rId3" imgW="1193760" imgH="787320" progId="Equation.3">
                   <p:embed/>
                 </p:oleObj>
               </mc:Choice>
@@ -19867,7 +19897,7 @@
           <a:graphicData uri="http://schemas.openxmlformats.org/presentationml/2006/ole">
             <mc:AlternateContent xmlns:mc="http://schemas.openxmlformats.org/markup-compatibility/2006">
               <mc:Choice xmlns:v="urn:schemas-microsoft-com:vml" Requires="v">
-                <p:oleObj spid="_x0000_s20507" name="Equation" r:id="rId5" imgW="1168200" imgH="787320" progId="Equation.3">
+                <p:oleObj spid="_x0000_s20514" name="Equation" r:id="rId5" imgW="1168200" imgH="787320" progId="Equation.3">
                   <p:embed/>
                 </p:oleObj>
               </mc:Choice>
@@ -19962,7 +19992,7 @@
           <a:graphicData uri="http://schemas.openxmlformats.org/presentationml/2006/ole">
             <mc:AlternateContent xmlns:mc="http://schemas.openxmlformats.org/markup-compatibility/2006">
               <mc:Choice xmlns:v="urn:schemas-microsoft-com:vml" Requires="v">
-                <p:oleObj spid="_x0000_s20508" name="Equation" r:id="rId7" imgW="1485720" imgH="279360" progId="Equation.3">
+                <p:oleObj spid="_x0000_s20515" name="Equation" r:id="rId7" imgW="1485720" imgH="279360" progId="Equation.3">
                   <p:embed/>
                 </p:oleObj>
               </mc:Choice>
@@ -20063,7 +20093,7 @@
           <a:graphicData uri="http://schemas.openxmlformats.org/presentationml/2006/ole">
             <mc:AlternateContent xmlns:mc="http://schemas.openxmlformats.org/markup-compatibility/2006">
               <mc:Choice xmlns:v="urn:schemas-microsoft-com:vml" Requires="v">
-                <p:oleObj spid="_x0000_s20509" name="Equation" r:id="rId9" imgW="1790640" imgH="876240" progId="Equation.3">
+                <p:oleObj spid="_x0000_s20516" name="Equation" r:id="rId9" imgW="1790640" imgH="876240" progId="Equation.3">
                   <p:embed/>
                 </p:oleObj>
               </mc:Choice>
@@ -20158,7 +20188,7 @@
           <a:graphicData uri="http://schemas.openxmlformats.org/presentationml/2006/ole">
             <mc:AlternateContent xmlns:mc="http://schemas.openxmlformats.org/markup-compatibility/2006">
               <mc:Choice xmlns:v="urn:schemas-microsoft-com:vml" Requires="v">
-                <p:oleObj spid="_x0000_s20510" name="Equation" r:id="rId11" imgW="1803240" imgH="876240" progId="Equation.3">
+                <p:oleObj spid="_x0000_s20517" name="Equation" r:id="rId11" imgW="1803240" imgH="876240" progId="Equation.3">
                   <p:embed/>
                 </p:oleObj>
               </mc:Choice>
@@ -20358,7 +20388,7 @@
           <a:graphicData uri="http://schemas.openxmlformats.org/presentationml/2006/ole">
             <mc:AlternateContent xmlns:mc="http://schemas.openxmlformats.org/markup-compatibility/2006">
               <mc:Choice xmlns:v="urn:schemas-microsoft-com:vml" Requires="v">
-                <p:oleObj spid="_x0000_s20511" name="Equation" r:id="rId13" imgW="660240" imgH="279360" progId="Equation.3">
+                <p:oleObj spid="_x0000_s20518" name="Equation" r:id="rId13" imgW="660240" imgH="279360" progId="Equation.3">
                   <p:embed/>
                 </p:oleObj>
               </mc:Choice>
@@ -25060,7 +25090,7 @@
           <a:graphicData uri="http://schemas.openxmlformats.org/presentationml/2006/ole">
             <mc:AlternateContent xmlns:mc="http://schemas.openxmlformats.org/markup-compatibility/2006">
               <mc:Choice xmlns:v="urn:schemas-microsoft-com:vml" Requires="v">
-                <p:oleObj spid="_x0000_s20512" name="Equation" r:id="rId15" imgW="2158920" imgH="5181480" progId="Equation.DSMT4">
+                <p:oleObj spid="_x0000_s20519" name="Equation" r:id="rId15" imgW="2158920" imgH="5181480" progId="Equation.DSMT4">
                   <p:embed/>
                 </p:oleObj>
               </mc:Choice>
@@ -25314,7 +25344,7 @@
           <a:graphicData uri="http://schemas.openxmlformats.org/presentationml/2006/ole">
             <mc:AlternateContent xmlns:mc="http://schemas.openxmlformats.org/markup-compatibility/2006">
               <mc:Choice xmlns:v="urn:schemas-microsoft-com:vml" Requires="v">
-                <p:oleObj spid="_x0000_s21534" name="Equation" r:id="rId4" imgW="2450880" imgH="419040" progId="Equation.3">
+                <p:oleObj spid="_x0000_s21541" name="Equation" r:id="rId4" imgW="2450880" imgH="419040" progId="Equation.3">
                   <p:embed/>
                 </p:oleObj>
               </mc:Choice>
@@ -25409,7 +25439,7 @@
           <a:graphicData uri="http://schemas.openxmlformats.org/presentationml/2006/ole">
             <mc:AlternateContent xmlns:mc="http://schemas.openxmlformats.org/markup-compatibility/2006">
               <mc:Choice xmlns:v="urn:schemas-microsoft-com:vml" Requires="v">
-                <p:oleObj spid="_x0000_s21535" name="Equation" r:id="rId6" imgW="1574640" imgH="927000" progId="Equation.3">
+                <p:oleObj spid="_x0000_s21542" name="Equation" r:id="rId6" imgW="1574640" imgH="927000" progId="Equation.3">
                   <p:embed/>
                 </p:oleObj>
               </mc:Choice>
@@ -25504,7 +25534,7 @@
           <a:graphicData uri="http://schemas.openxmlformats.org/presentationml/2006/ole">
             <mc:AlternateContent xmlns:mc="http://schemas.openxmlformats.org/markup-compatibility/2006">
               <mc:Choice xmlns:v="urn:schemas-microsoft-com:vml" Requires="v">
-                <p:oleObj spid="_x0000_s21536" name="Equation" r:id="rId8" imgW="1447560" imgH="850680" progId="Equation.3">
+                <p:oleObj spid="_x0000_s21543" name="Equation" r:id="rId8" imgW="1447560" imgH="850680" progId="Equation.3">
                   <p:embed/>
                 </p:oleObj>
               </mc:Choice>
@@ -25637,7 +25667,7 @@
           <a:graphicData uri="http://schemas.openxmlformats.org/presentationml/2006/ole">
             <mc:AlternateContent xmlns:mc="http://schemas.openxmlformats.org/markup-compatibility/2006">
               <mc:Choice xmlns:v="urn:schemas-microsoft-com:vml" Requires="v">
-                <p:oleObj spid="_x0000_s21537" name="Equation" r:id="rId10" imgW="1485720" imgH="380880" progId="Equation.3">
+                <p:oleObj spid="_x0000_s21544" name="Equation" r:id="rId10" imgW="1485720" imgH="380880" progId="Equation.3">
                   <p:embed/>
                 </p:oleObj>
               </mc:Choice>
@@ -25733,7 +25763,7 @@
           <a:graphicData uri="http://schemas.openxmlformats.org/presentationml/2006/ole">
             <mc:AlternateContent xmlns:mc="http://schemas.openxmlformats.org/markup-compatibility/2006">
               <mc:Choice xmlns:v="urn:schemas-microsoft-com:vml" Requires="v">
-                <p:oleObj spid="_x0000_s21538" name="Equation" r:id="rId12" imgW="2565360" imgH="419040" progId="Equation.3">
+                <p:oleObj spid="_x0000_s21545" name="Equation" r:id="rId12" imgW="2565360" imgH="419040" progId="Equation.3">
                   <p:embed/>
                 </p:oleObj>
               </mc:Choice>
@@ -25831,7 +25861,7 @@
           <a:graphicData uri="http://schemas.openxmlformats.org/presentationml/2006/ole">
             <mc:AlternateContent xmlns:mc="http://schemas.openxmlformats.org/markup-compatibility/2006">
               <mc:Choice xmlns:v="urn:schemas-microsoft-com:vml" Requires="v">
-                <p:oleObj spid="_x0000_s21539" name="Equation" r:id="rId14" imgW="1422360" imgH="850680" progId="Equation.3">
+                <p:oleObj spid="_x0000_s21546" name="Equation" r:id="rId14" imgW="1422360" imgH="850680" progId="Equation.3">
                   <p:embed/>
                 </p:oleObj>
               </mc:Choice>
@@ -25926,7 +25956,7 @@
           <a:graphicData uri="http://schemas.openxmlformats.org/presentationml/2006/ole">
             <mc:AlternateContent xmlns:mc="http://schemas.openxmlformats.org/markup-compatibility/2006">
               <mc:Choice xmlns:v="urn:schemas-microsoft-com:vml" Requires="v">
-                <p:oleObj spid="_x0000_s21540" name="Equation" r:id="rId16" imgW="660240" imgH="279360" progId="Equation.3">
+                <p:oleObj spid="_x0000_s21547" name="Equation" r:id="rId16" imgW="660240" imgH="279360" progId="Equation.3">
                   <p:embed/>
                 </p:oleObj>
               </mc:Choice>
@@ -26517,7 +26547,7 @@
           <a:graphicData uri="http://schemas.openxmlformats.org/presentationml/2006/ole">
             <mc:AlternateContent xmlns:mc="http://schemas.openxmlformats.org/markup-compatibility/2006">
               <mc:Choice xmlns:v="urn:schemas-microsoft-com:vml" Requires="v">
-                <p:oleObj spid="_x0000_s23579" name="Equation" r:id="rId3" imgW="1447560" imgH="850680" progId="Equation.3">
+                <p:oleObj spid="_x0000_s23585" name="Equation" r:id="rId3" imgW="1447560" imgH="850680" progId="Equation.3">
                   <p:embed/>
                 </p:oleObj>
               </mc:Choice>
@@ -26612,7 +26642,7 @@
           <a:graphicData uri="http://schemas.openxmlformats.org/presentationml/2006/ole">
             <mc:AlternateContent xmlns:mc="http://schemas.openxmlformats.org/markup-compatibility/2006">
               <mc:Choice xmlns:v="urn:schemas-microsoft-com:vml" Requires="v">
-                <p:oleObj spid="_x0000_s23580" name="Equation" r:id="rId5" imgW="1422360" imgH="850680" progId="Equation.3">
+                <p:oleObj spid="_x0000_s23586" name="Equation" r:id="rId5" imgW="1422360" imgH="850680" progId="Equation.3">
                   <p:embed/>
                 </p:oleObj>
               </mc:Choice>
@@ -26713,7 +26743,7 @@
           <a:graphicData uri="http://schemas.openxmlformats.org/presentationml/2006/ole">
             <mc:AlternateContent xmlns:mc="http://schemas.openxmlformats.org/markup-compatibility/2006">
               <mc:Choice xmlns:v="urn:schemas-microsoft-com:vml" Requires="v">
-                <p:oleObj spid="_x0000_s23581" name="Equation" r:id="rId7" imgW="1485720" imgH="279360" progId="Equation.DSMT4">
+                <p:oleObj spid="_x0000_s23587" name="Equation" r:id="rId7" imgW="1485720" imgH="279360" progId="Equation.DSMT4">
                   <p:embed/>
                 </p:oleObj>
               </mc:Choice>
@@ -26808,7 +26838,7 @@
           <a:graphicData uri="http://schemas.openxmlformats.org/presentationml/2006/ole">
             <mc:AlternateContent xmlns:mc="http://schemas.openxmlformats.org/markup-compatibility/2006">
               <mc:Choice xmlns:v="urn:schemas-microsoft-com:vml" Requires="v">
-                <p:oleObj spid="_x0000_s23582" name="Equation" r:id="rId9" imgW="2158920" imgH="927000" progId="Equation.3">
+                <p:oleObj spid="_x0000_s23588" name="Equation" r:id="rId9" imgW="2158920" imgH="927000" progId="Equation.3">
                   <p:embed/>
                 </p:oleObj>
               </mc:Choice>
@@ -26903,7 +26933,7 @@
           <a:graphicData uri="http://schemas.openxmlformats.org/presentationml/2006/ole">
             <mc:AlternateContent xmlns:mc="http://schemas.openxmlformats.org/markup-compatibility/2006">
               <mc:Choice xmlns:v="urn:schemas-microsoft-com:vml" Requires="v">
-                <p:oleObj spid="_x0000_s23583" name="Equation" r:id="rId11" imgW="2197080" imgH="927000" progId="Equation.3">
+                <p:oleObj spid="_x0000_s23589" name="Equation" r:id="rId11" imgW="2197080" imgH="927000" progId="Equation.3">
                   <p:embed/>
                 </p:oleObj>
               </mc:Choice>
@@ -27103,7 +27133,7 @@
           <a:graphicData uri="http://schemas.openxmlformats.org/presentationml/2006/ole">
             <mc:AlternateContent xmlns:mc="http://schemas.openxmlformats.org/markup-compatibility/2006">
               <mc:Choice xmlns:v="urn:schemas-microsoft-com:vml" Requires="v">
-                <p:oleObj spid="_x0000_s23584" name="Equation" r:id="rId13" imgW="660240" imgH="279360" progId="Equation.3">
+                <p:oleObj spid="_x0000_s23590" name="Equation" r:id="rId13" imgW="660240" imgH="279360" progId="Equation.3">
                   <p:embed/>
                 </p:oleObj>
               </mc:Choice>
@@ -27222,7 +27252,7 @@
                           </m:mcs>
                           <m:ctrlPr>
                             <a:rPr lang="en-US" i="1">
-                              <a:latin typeface="Cambria Math"/>
+                              <a:latin typeface="Cambria Math" panose="02040503050406030204" pitchFamily="18" charset="0"/>
                             </a:rPr>
                           </m:ctrlPr>
                         </m:mPr>
@@ -27264,7 +27294,7 @@
                               <m:sSubPr>
                                 <m:ctrlPr>
                                   <a:rPr lang="en-US" i="1">
-                                    <a:latin typeface="Cambria Math"/>
+                                    <a:latin typeface="Cambria Math" panose="02040503050406030204" pitchFamily="18" charset="0"/>
                                   </a:rPr>
                                 </m:ctrlPr>
                               </m:sSubPr>
@@ -27295,7 +27325,7 @@
                               <m:sSubPr>
                                 <m:ctrlPr>
                                   <a:rPr lang="en-US" i="1">
-                                    <a:latin typeface="Cambria Math"/>
+                                    <a:latin typeface="Cambria Math" panose="02040503050406030204" pitchFamily="18" charset="0"/>
                                   </a:rPr>
                                 </m:ctrlPr>
                               </m:sSubPr>
@@ -27321,7 +27351,7 @@
                                 <m:degHide m:val="on"/>
                                 <m:ctrlPr>
                                   <a:rPr lang="en-US" i="1">
-                                    <a:latin typeface="Cambria Math"/>
+                                    <a:latin typeface="Cambria Math" panose="02040503050406030204" pitchFamily="18" charset="0"/>
                                   </a:rPr>
                                 </m:ctrlPr>
                               </m:radPr>
@@ -27331,7 +27361,7 @@
                                   <m:fPr>
                                     <m:ctrlPr>
                                       <a:rPr lang="en-US" i="1">
-                                        <a:latin typeface="Cambria Math"/>
+                                        <a:latin typeface="Cambria Math" panose="02040503050406030204" pitchFamily="18" charset="0"/>
                                       </a:rPr>
                                     </m:ctrlPr>
                                   </m:fPr>
@@ -27340,7 +27370,7 @@
                                       <m:sSubPr>
                                         <m:ctrlPr>
                                           <a:rPr lang="en-US" i="1">
-                                            <a:latin typeface="Cambria Math"/>
+                                            <a:latin typeface="Cambria Math" panose="02040503050406030204" pitchFamily="18" charset="0"/>
                                           </a:rPr>
                                         </m:ctrlPr>
                                       </m:sSubPr>
@@ -27435,7 +27465,7 @@
                               <m:sSubPr>
                                 <m:ctrlPr>
                                   <a:rPr lang="en-US" i="1">
-                                    <a:latin typeface="Cambria Math"/>
+                                    <a:latin typeface="Cambria Math" panose="02040503050406030204" pitchFamily="18" charset="0"/>
                                   </a:rPr>
                                 </m:ctrlPr>
                               </m:sSubPr>
@@ -27461,7 +27491,7 @@
                                 <m:degHide m:val="on"/>
                                 <m:ctrlPr>
                                   <a:rPr lang="en-US" i="1">
-                                    <a:latin typeface="Cambria Math"/>
+                                    <a:latin typeface="Cambria Math" panose="02040503050406030204" pitchFamily="18" charset="0"/>
                                   </a:rPr>
                                 </m:ctrlPr>
                               </m:radPr>
@@ -27471,7 +27501,7 @@
                                   <m:fPr>
                                     <m:ctrlPr>
                                       <a:rPr lang="en-US" i="1">
-                                        <a:latin typeface="Cambria Math"/>
+                                        <a:latin typeface="Cambria Math" panose="02040503050406030204" pitchFamily="18" charset="0"/>
                                       </a:rPr>
                                     </m:ctrlPr>
                                   </m:fPr>
@@ -27480,7 +27510,7 @@
                                       <m:sSubPr>
                                         <m:ctrlPr>
                                           <a:rPr lang="en-US" i="1">
-                                            <a:latin typeface="Cambria Math"/>
+                                            <a:latin typeface="Cambria Math" panose="02040503050406030204" pitchFamily="18" charset="0"/>
                                           </a:rPr>
                                         </m:ctrlPr>
                                       </m:sSubPr>
@@ -27541,7 +27571,7 @@
                               <m:sSubPr>
                                 <m:ctrlPr>
                                   <a:rPr lang="en-US" i="1">
-                                    <a:latin typeface="Cambria Math"/>
+                                    <a:latin typeface="Cambria Math" panose="02040503050406030204" pitchFamily="18" charset="0"/>
                                   </a:rPr>
                                 </m:ctrlPr>
                               </m:sSubPr>
@@ -27567,7 +27597,7 @@
                                 <m:degHide m:val="on"/>
                                 <m:ctrlPr>
                                   <a:rPr lang="en-US" i="1">
-                                    <a:latin typeface="Cambria Math"/>
+                                    <a:latin typeface="Cambria Math" panose="02040503050406030204" pitchFamily="18" charset="0"/>
                                   </a:rPr>
                                 </m:ctrlPr>
                               </m:radPr>
@@ -27583,7 +27613,7 @@
                                   <m:sSubPr>
                                     <m:ctrlPr>
                                       <a:rPr lang="en-US" i="1">
-                                        <a:latin typeface="Cambria Math"/>
+                                        <a:latin typeface="Cambria Math" panose="02040503050406030204" pitchFamily="18" charset="0"/>
                                       </a:rPr>
                                     </m:ctrlPr>
                                   </m:sSubPr>
@@ -27755,7 +27785,7 @@
           <a:graphicData uri="http://schemas.openxmlformats.org/presentationml/2006/ole">
             <mc:AlternateContent xmlns:mc="http://schemas.openxmlformats.org/markup-compatibility/2006">
               <mc:Choice xmlns:v="urn:schemas-microsoft-com:vml" Requires="v">
-                <p:oleObj spid="_x0000_s24586" name="Equation" r:id="rId4" imgW="1803240" imgH="876240" progId="Equation.3">
+                <p:oleObj spid="_x0000_s24588" name="Equation" r:id="rId4" imgW="1803240" imgH="876240" progId="Equation.3">
                   <p:embed/>
                 </p:oleObj>
               </mc:Choice>
@@ -27850,7 +27880,7 @@
           <a:graphicData uri="http://schemas.openxmlformats.org/presentationml/2006/ole">
             <mc:AlternateContent xmlns:mc="http://schemas.openxmlformats.org/markup-compatibility/2006">
               <mc:Choice xmlns:v="urn:schemas-microsoft-com:vml" Requires="v">
-                <p:oleObj spid="_x0000_s24587" name="Equation" r:id="rId6" imgW="2197080" imgH="927000" progId="Equation.3">
+                <p:oleObj spid="_x0000_s24589" name="Equation" r:id="rId6" imgW="2197080" imgH="927000" progId="Equation.3">
                   <p:embed/>
                 </p:oleObj>
               </mc:Choice>
@@ -29139,7 +29169,7 @@
           <a:graphicData uri="http://schemas.openxmlformats.org/presentationml/2006/ole">
             <mc:AlternateContent xmlns:mc="http://schemas.openxmlformats.org/markup-compatibility/2006">
               <mc:Choice xmlns:v="urn:schemas-microsoft-com:vml" Requires="v">
-                <p:oleObj spid="_x0000_s27687" name="Equation" r:id="rId3" imgW="1714320" imgH="342720" progId="Equation.3">
+                <p:oleObj spid="_x0000_s27698" name="Equation" r:id="rId3" imgW="1714320" imgH="342720" progId="Equation.3">
                   <p:embed/>
                 </p:oleObj>
               </mc:Choice>
@@ -29234,7 +29264,7 @@
           <a:graphicData uri="http://schemas.openxmlformats.org/presentationml/2006/ole">
             <mc:AlternateContent xmlns:mc="http://schemas.openxmlformats.org/markup-compatibility/2006">
               <mc:Choice xmlns:v="urn:schemas-microsoft-com:vml" Requires="v">
-                <p:oleObj spid="_x0000_s27688" name="Equation" r:id="rId5" imgW="1231560" imgH="914400" progId="Equation.3">
+                <p:oleObj spid="_x0000_s27699" name="Equation" r:id="rId5" imgW="1231560" imgH="914400" progId="Equation.3">
                   <p:embed/>
                 </p:oleObj>
               </mc:Choice>
@@ -29329,7 +29359,7 @@
           <a:graphicData uri="http://schemas.openxmlformats.org/presentationml/2006/ole">
             <mc:AlternateContent xmlns:mc="http://schemas.openxmlformats.org/markup-compatibility/2006">
               <mc:Choice xmlns:v="urn:schemas-microsoft-com:vml" Requires="v">
-                <p:oleObj spid="_x0000_s27689" name="Equation" r:id="rId7" imgW="1447560" imgH="952200" progId="Equation.3">
+                <p:oleObj spid="_x0000_s27700" name="Equation" r:id="rId7" imgW="1447560" imgH="952200" progId="Equation.3">
                   <p:embed/>
                 </p:oleObj>
               </mc:Choice>
@@ -29424,7 +29454,7 @@
           <a:graphicData uri="http://schemas.openxmlformats.org/presentationml/2006/ole">
             <mc:AlternateContent xmlns:mc="http://schemas.openxmlformats.org/markup-compatibility/2006">
               <mc:Choice xmlns:v="urn:schemas-microsoft-com:vml" Requires="v">
-                <p:oleObj spid="_x0000_s27690" name="Equation" r:id="rId9" imgW="1574640" imgH="380880" progId="Equation.3">
+                <p:oleObj spid="_x0000_s27701" name="Equation" r:id="rId9" imgW="1574640" imgH="380880" progId="Equation.3">
                   <p:embed/>
                 </p:oleObj>
               </mc:Choice>
@@ -29519,7 +29549,7 @@
           <a:graphicData uri="http://schemas.openxmlformats.org/presentationml/2006/ole">
             <mc:AlternateContent xmlns:mc="http://schemas.openxmlformats.org/markup-compatibility/2006">
               <mc:Choice xmlns:v="urn:schemas-microsoft-com:vml" Requires="v">
-                <p:oleObj spid="_x0000_s27691" name="Equation" r:id="rId11" imgW="2095200" imgH="863280" progId="Equation.3">
+                <p:oleObj spid="_x0000_s27702" name="Equation" r:id="rId11" imgW="2095200" imgH="863280" progId="Equation.3">
                   <p:embed/>
                 </p:oleObj>
               </mc:Choice>
@@ -29614,7 +29644,7 @@
           <a:graphicData uri="http://schemas.openxmlformats.org/presentationml/2006/ole">
             <mc:AlternateContent xmlns:mc="http://schemas.openxmlformats.org/markup-compatibility/2006">
               <mc:Choice xmlns:v="urn:schemas-microsoft-com:vml" Requires="v">
-                <p:oleObj spid="_x0000_s27692" name="Equation" r:id="rId13" imgW="1536480" imgH="876240" progId="Equation.3">
+                <p:oleObj spid="_x0000_s27703" name="Equation" r:id="rId13" imgW="1536480" imgH="876240" progId="Equation.3">
                   <p:embed/>
                 </p:oleObj>
               </mc:Choice>
@@ -29709,7 +29739,7 @@
           <a:graphicData uri="http://schemas.openxmlformats.org/presentationml/2006/ole">
             <mc:AlternateContent xmlns:mc="http://schemas.openxmlformats.org/markup-compatibility/2006">
               <mc:Choice xmlns:v="urn:schemas-microsoft-com:vml" Requires="v">
-                <p:oleObj spid="_x0000_s27693" name="Equation" r:id="rId15" imgW="660240" imgH="279360" progId="Equation.3">
+                <p:oleObj spid="_x0000_s27704" name="Equation" r:id="rId15" imgW="660240" imgH="279360" progId="Equation.3">
                   <p:embed/>
                 </p:oleObj>
               </mc:Choice>
@@ -29927,7 +29957,7 @@
           <a:graphicData uri="http://schemas.openxmlformats.org/presentationml/2006/ole">
             <mc:AlternateContent xmlns:mc="http://schemas.openxmlformats.org/markup-compatibility/2006">
               <mc:Choice xmlns:v="urn:schemas-microsoft-com:vml" Requires="v">
-                <p:oleObj spid="_x0000_s27694" name="Equation" r:id="rId17" imgW="1447560" imgH="952200" progId="Equation.3">
+                <p:oleObj spid="_x0000_s27705" name="Equation" r:id="rId17" imgW="1447560" imgH="952200" progId="Equation.3">
                   <p:embed/>
                 </p:oleObj>
               </mc:Choice>
@@ -30022,7 +30052,7 @@
           <a:graphicData uri="http://schemas.openxmlformats.org/presentationml/2006/ole">
             <mc:AlternateContent xmlns:mc="http://schemas.openxmlformats.org/markup-compatibility/2006">
               <mc:Choice xmlns:v="urn:schemas-microsoft-com:vml" Requires="v">
-                <p:oleObj spid="_x0000_s27695" name="Equation" r:id="rId19" imgW="1460160" imgH="850680" progId="Equation.3">
+                <p:oleObj spid="_x0000_s27706" name="Equation" r:id="rId19" imgW="1460160" imgH="850680" progId="Equation.3">
                   <p:embed/>
                 </p:oleObj>
               </mc:Choice>
@@ -30117,7 +30147,7 @@
           <a:graphicData uri="http://schemas.openxmlformats.org/presentationml/2006/ole">
             <mc:AlternateContent xmlns:mc="http://schemas.openxmlformats.org/markup-compatibility/2006">
               <mc:Choice xmlns:v="urn:schemas-microsoft-com:vml" Requires="v">
-                <p:oleObj spid="_x0000_s27696" name="Equation" r:id="rId21" imgW="1841400" imgH="1333440" progId="Equation.3">
+                <p:oleObj spid="_x0000_s27707" name="Equation" r:id="rId21" imgW="1841400" imgH="1333440" progId="Equation.3">
                   <p:embed/>
                 </p:oleObj>
               </mc:Choice>
@@ -30212,7 +30242,7 @@
           <a:graphicData uri="http://schemas.openxmlformats.org/presentationml/2006/ole">
             <mc:AlternateContent xmlns:mc="http://schemas.openxmlformats.org/markup-compatibility/2006">
               <mc:Choice xmlns:v="urn:schemas-microsoft-com:vml" Requires="v">
-                <p:oleObj spid="_x0000_s27697" name="Equation" r:id="rId23" imgW="1562040" imgH="787320" progId="Equation.3">
+                <p:oleObj spid="_x0000_s27708" name="Equation" r:id="rId23" imgW="1562040" imgH="787320" progId="Equation.3">
                   <p:embed/>
                 </p:oleObj>
               </mc:Choice>
@@ -30602,7 +30632,7 @@
           <a:graphicData uri="http://schemas.openxmlformats.org/presentationml/2006/ole">
             <mc:AlternateContent xmlns:mc="http://schemas.openxmlformats.org/markup-compatibility/2006">
               <mc:Choice xmlns:v="urn:schemas-microsoft-com:vml" Requires="v">
-                <p:oleObj spid="_x0000_s28720" name="Equation" r:id="rId3" imgW="1155600" imgH="279360" progId="Equation.3">
+                <p:oleObj spid="_x0000_s28729" name="Equation" r:id="rId3" imgW="1155600" imgH="279360" progId="Equation.3">
                   <p:embed/>
                 </p:oleObj>
               </mc:Choice>
@@ -30697,7 +30727,7 @@
           <a:graphicData uri="http://schemas.openxmlformats.org/presentationml/2006/ole">
             <mc:AlternateContent xmlns:mc="http://schemas.openxmlformats.org/markup-compatibility/2006">
               <mc:Choice xmlns:v="urn:schemas-microsoft-com:vml" Requires="v">
-                <p:oleObj spid="_x0000_s28721" name="Equation" r:id="rId5" imgW="2349360" imgH="876240" progId="Equation.3">
+                <p:oleObj spid="_x0000_s28730" name="Equation" r:id="rId5" imgW="2349360" imgH="876240" progId="Equation.3">
                   <p:embed/>
                 </p:oleObj>
               </mc:Choice>
@@ -30792,7 +30822,7 @@
           <a:graphicData uri="http://schemas.openxmlformats.org/presentationml/2006/ole">
             <mc:AlternateContent xmlns:mc="http://schemas.openxmlformats.org/markup-compatibility/2006">
               <mc:Choice xmlns:v="urn:schemas-microsoft-com:vml" Requires="v">
-                <p:oleObj spid="_x0000_s28722" name="Equation" r:id="rId7" imgW="2095200" imgH="1002960" progId="Equation.3">
+                <p:oleObj spid="_x0000_s28731" name="Equation" r:id="rId7" imgW="2095200" imgH="1002960" progId="Equation.3">
                   <p:embed/>
                 </p:oleObj>
               </mc:Choice>
@@ -30887,7 +30917,7 @@
           <a:graphicData uri="http://schemas.openxmlformats.org/presentationml/2006/ole">
             <mc:AlternateContent xmlns:mc="http://schemas.openxmlformats.org/markup-compatibility/2006">
               <mc:Choice xmlns:v="urn:schemas-microsoft-com:vml" Requires="v">
-                <p:oleObj spid="_x0000_s28723" name="Equation" r:id="rId9" imgW="1333440" imgH="279360" progId="Equation.3">
+                <p:oleObj spid="_x0000_s28732" name="Equation" r:id="rId9" imgW="1333440" imgH="279360" progId="Equation.3">
                   <p:embed/>
                 </p:oleObj>
               </mc:Choice>
@@ -30982,7 +31012,7 @@
           <a:graphicData uri="http://schemas.openxmlformats.org/presentationml/2006/ole">
             <mc:AlternateContent xmlns:mc="http://schemas.openxmlformats.org/markup-compatibility/2006">
               <mc:Choice xmlns:v="urn:schemas-microsoft-com:vml" Requires="v">
-                <p:oleObj spid="_x0000_s28724" name="Equation" r:id="rId11" imgW="1892160" imgH="419040" progId="Equation.3">
+                <p:oleObj spid="_x0000_s28733" name="Equation" r:id="rId11" imgW="1892160" imgH="419040" progId="Equation.3">
                   <p:embed/>
                 </p:oleObj>
               </mc:Choice>
@@ -31077,7 +31107,7 @@
           <a:graphicData uri="http://schemas.openxmlformats.org/presentationml/2006/ole">
             <mc:AlternateContent xmlns:mc="http://schemas.openxmlformats.org/markup-compatibility/2006">
               <mc:Choice xmlns:v="urn:schemas-microsoft-com:vml" Requires="v">
-                <p:oleObj spid="_x0000_s28725" name="Equation" r:id="rId13" imgW="2145960" imgH="876240" progId="Equation.3">
+                <p:oleObj spid="_x0000_s28734" name="Equation" r:id="rId13" imgW="2145960" imgH="876240" progId="Equation.3">
                   <p:embed/>
                 </p:oleObj>
               </mc:Choice>
@@ -31347,7 +31377,7 @@
           <a:graphicData uri="http://schemas.openxmlformats.org/presentationml/2006/ole">
             <mc:AlternateContent xmlns:mc="http://schemas.openxmlformats.org/markup-compatibility/2006">
               <mc:Choice xmlns:v="urn:schemas-microsoft-com:vml" Requires="v">
-                <p:oleObj spid="_x0000_s28726" name="Equation" r:id="rId15" imgW="2755800" imgH="253800" progId="Equation.2">
+                <p:oleObj spid="_x0000_s28735" name="Equation" r:id="rId15" imgW="2755800" imgH="253800" progId="Equation.2">
                   <p:embed/>
                 </p:oleObj>
               </mc:Choice>
@@ -31512,7 +31542,7 @@
           <a:graphicData uri="http://schemas.openxmlformats.org/presentationml/2006/ole">
             <mc:AlternateContent xmlns:mc="http://schemas.openxmlformats.org/markup-compatibility/2006">
               <mc:Choice xmlns:v="urn:schemas-microsoft-com:vml" Requires="v">
-                <p:oleObj spid="_x0000_s28727" name="Equation" r:id="rId17" imgW="1384200" imgH="863280" progId="Equation.3">
+                <p:oleObj spid="_x0000_s28736" name="Equation" r:id="rId17" imgW="1384200" imgH="863280" progId="Equation.3">
                   <p:embed/>
                 </p:oleObj>
               </mc:Choice>
@@ -31607,7 +31637,7 @@
           <a:graphicData uri="http://schemas.openxmlformats.org/presentationml/2006/ole">
             <mc:AlternateContent xmlns:mc="http://schemas.openxmlformats.org/markup-compatibility/2006">
               <mc:Choice xmlns:v="urn:schemas-microsoft-com:vml" Requires="v">
-                <p:oleObj spid="_x0000_s28728" name="Equation" r:id="rId19" imgW="1320480" imgH="863280" progId="Equation.3">
+                <p:oleObj spid="_x0000_s28737" name="Equation" r:id="rId19" imgW="1320480" imgH="863280" progId="Equation.3">
                   <p:embed/>
                 </p:oleObj>
               </mc:Choice>

</xml_diff>